<commit_message>
Updates to report file
</commit_message>
<xml_diff>
--- a/doc/Protein-Protein Docking.pptx
+++ b/doc/Protein-Protein Docking.pptx
@@ -13,10 +13,11 @@
     <p:sldId id="261" r:id="rId7"/>
     <p:sldId id="262" r:id="rId8"/>
     <p:sldId id="263" r:id="rId9"/>
-    <p:sldId id="264" r:id="rId10"/>
-    <p:sldId id="265" r:id="rId11"/>
-    <p:sldId id="266" r:id="rId12"/>
-    <p:sldId id="267" r:id="rId13"/>
+    <p:sldId id="268" r:id="rId10"/>
+    <p:sldId id="264" r:id="rId11"/>
+    <p:sldId id="265" r:id="rId12"/>
+    <p:sldId id="266" r:id="rId13"/>
+    <p:sldId id="267" r:id="rId14"/>
   </p:sldIdLst>
   <p:sldSz cx="12192000" cy="6858000"/>
   <p:notesSz cx="6858000" cy="9144000"/>
@@ -3266,7 +3267,7 @@
           <a:p>
             <a:r>
               <a:rPr lang="en-US" dirty="0" smtClean="0"/>
-              <a:t>Visualization</a:t>
+              <a:t>Evaluation</a:t>
             </a:r>
             <a:endParaRPr lang="en-US" dirty="0"/>
           </a:p>
@@ -3288,14 +3289,68 @@
           <a:lstStyle/>
           <a:p>
             <a:r>
-              <a:rPr lang="en-US" dirty="0" smtClean="0"/>
-              <a:t>Scatter plots will be used to visualize evaluations</a:t>
-            </a:r>
-          </a:p>
-          <a:p>
-            <a:r>
-              <a:rPr lang="en-US" dirty="0" smtClean="0"/>
-              <a:t>Chimera will be used to show predicted docking</a:t>
+              <a:rPr lang="en-US" dirty="0" err="1" smtClean="0"/>
+              <a:t>Rmsd</a:t>
+            </a:r>
+            <a:r>
+              <a:rPr lang="en-US" dirty="0" smtClean="0"/>
+              <a:t> of interfaces</a:t>
+            </a:r>
+          </a:p>
+          <a:p>
+            <a:r>
+              <a:rPr lang="en-US" dirty="0" smtClean="0"/>
+              <a:t>% similarity between predicted residue-residue interface sequence and native interface</a:t>
+            </a:r>
+          </a:p>
+          <a:p>
+            <a:r>
+              <a:rPr lang="en-US" dirty="0" smtClean="0"/>
+              <a:t>Un-optimized vs Optimized predictions</a:t>
+            </a:r>
+          </a:p>
+          <a:p>
+            <a:r>
+              <a:rPr lang="en-US" dirty="0" smtClean="0"/>
+              <a:t>Score (</a:t>
+            </a:r>
+            <a:r>
+              <a:rPr lang="en-US" dirty="0" err="1" smtClean="0"/>
+              <a:t>Zdock</a:t>
+            </a:r>
+            <a:r>
+              <a:rPr lang="en-US" dirty="0" smtClean="0"/>
+              <a:t>, </a:t>
+            </a:r>
+            <a:r>
+              <a:rPr lang="en-US" dirty="0" err="1" smtClean="0"/>
+              <a:t>RosettaDock</a:t>
+            </a:r>
+            <a:r>
+              <a:rPr lang="en-US" dirty="0" smtClean="0"/>
+              <a:t>, etc.) vs </a:t>
+            </a:r>
+            <a:r>
+              <a:rPr lang="en-US" dirty="0" err="1" smtClean="0"/>
+              <a:t>rmsd</a:t>
+            </a:r>
+            <a:r>
+              <a:rPr lang="en-US" dirty="0" smtClean="0"/>
+              <a:t> and</a:t>
+            </a:r>
+            <a:br>
+              <a:rPr lang="en-US" dirty="0" smtClean="0"/>
+            </a:br>
+            <a:r>
+              <a:rPr lang="en-US" dirty="0" smtClean="0"/>
+              <a:t>similarity will be used for both optimized</a:t>
+            </a:r>
+            <a:br>
+              <a:rPr lang="en-US" dirty="0" smtClean="0"/>
+            </a:br>
+            <a:r>
+              <a:rPr lang="en-US" dirty="0" smtClean="0"/>
+              <a:t>and un-optimized predictions for comparison</a:t>
             </a:r>
             <a:endParaRPr lang="en-US" dirty="0"/>
           </a:p>
@@ -3317,7 +3372,7 @@
         </p:blipFill>
         <p:spPr>
           <a:xfrm>
-            <a:off x="1477197" y="3391544"/>
+            <a:off x="7086600" y="3581400"/>
             <a:ext cx="3879533" cy="2477550"/>
           </a:xfrm>
           <a:prstGeom prst="rect">
@@ -3333,7 +3388,7 @@
         </p:nvSpPr>
         <p:spPr>
           <a:xfrm>
-            <a:off x="1091101" y="3022212"/>
+            <a:off x="6700504" y="3212068"/>
             <a:ext cx="4651723" cy="369332"/>
           </a:xfrm>
           <a:prstGeom prst="rect">
@@ -3355,33 +3410,10 @@
           </a:p>
         </p:txBody>
       </p:sp>
-      <p:pic>
-        <p:nvPicPr>
-          <p:cNvPr id="7" name="Picture 6"/>
-          <p:cNvPicPr>
-            <a:picLocks noChangeAspect="1"/>
-          </p:cNvPicPr>
-          <p:nvPr/>
-        </p:nvPicPr>
-        <p:blipFill rotWithShape="1">
-          <a:blip r:embed="rId3"/>
-          <a:srcRect l="9561" r="19671" b="26249"/>
-          <a:stretch/>
-        </p:blipFill>
-        <p:spPr>
-          <a:xfrm>
-            <a:off x="6934200" y="2191599"/>
-            <a:ext cx="3733800" cy="3785867"/>
-          </a:xfrm>
-          <a:prstGeom prst="rect">
-            <a:avLst/>
-          </a:prstGeom>
-        </p:spPr>
-      </p:pic>
     </p:spTree>
     <p:extLst>
       <p:ext uri="{BB962C8B-B14F-4D97-AF65-F5344CB8AC3E}">
-        <p14:creationId xmlns:p14="http://schemas.microsoft.com/office/powerpoint/2010/main" val="2484305846"/>
+        <p14:creationId xmlns:p14="http://schemas.microsoft.com/office/powerpoint/2010/main" val="487030976"/>
       </p:ext>
     </p:extLst>
   </p:cSld>
@@ -3432,6 +3464,172 @@
           <a:p>
             <a:r>
               <a:rPr lang="en-US" dirty="0" smtClean="0"/>
+              <a:t>Visualization</a:t>
+            </a:r>
+            <a:endParaRPr lang="en-US" dirty="0"/>
+          </a:p>
+        </p:txBody>
+      </p:sp>
+      <p:sp>
+        <p:nvSpPr>
+          <p:cNvPr id="3" name="Content Placeholder 2"/>
+          <p:cNvSpPr>
+            <a:spLocks noGrp="1"/>
+          </p:cNvSpPr>
+          <p:nvPr>
+            <p:ph idx="1"/>
+          </p:nvPr>
+        </p:nvSpPr>
+        <p:spPr/>
+        <p:txBody>
+          <a:bodyPr/>
+          <a:lstStyle/>
+          <a:p>
+            <a:r>
+              <a:rPr lang="en-US" dirty="0" smtClean="0"/>
+              <a:t>Scatter plots will be used to visualize evaluations</a:t>
+            </a:r>
+          </a:p>
+          <a:p>
+            <a:r>
+              <a:rPr lang="en-US" dirty="0" smtClean="0"/>
+              <a:t>Chimera will be used to show predicted docking</a:t>
+            </a:r>
+            <a:endParaRPr lang="en-US" dirty="0"/>
+          </a:p>
+        </p:txBody>
+      </p:sp>
+      <p:pic>
+        <p:nvPicPr>
+          <p:cNvPr id="4" name="Picture 3"/>
+          <p:cNvPicPr>
+            <a:picLocks noChangeAspect="1"/>
+          </p:cNvPicPr>
+          <p:nvPr/>
+        </p:nvPicPr>
+        <p:blipFill>
+          <a:blip r:embed="rId2"/>
+          <a:stretch>
+            <a:fillRect/>
+          </a:stretch>
+        </p:blipFill>
+        <p:spPr>
+          <a:xfrm>
+            <a:off x="1477197" y="3391544"/>
+            <a:ext cx="3879533" cy="2477550"/>
+          </a:xfrm>
+          <a:prstGeom prst="rect">
+            <a:avLst/>
+          </a:prstGeom>
+        </p:spPr>
+      </p:pic>
+      <p:sp>
+        <p:nvSpPr>
+          <p:cNvPr id="5" name="TextBox 4"/>
+          <p:cNvSpPr txBox="1"/>
+          <p:nvPr/>
+        </p:nvSpPr>
+        <p:spPr>
+          <a:xfrm>
+            <a:off x="1091101" y="3022212"/>
+            <a:ext cx="4651723" cy="369332"/>
+          </a:xfrm>
+          <a:prstGeom prst="rect">
+            <a:avLst/>
+          </a:prstGeom>
+          <a:noFill/>
+        </p:spPr>
+        <p:txBody>
+          <a:bodyPr wrap="none" rtlCol="0">
+            <a:spAutoFit/>
+          </a:bodyPr>
+          <a:lstStyle/>
+          <a:p>
+            <a:r>
+              <a:rPr lang="en-US" dirty="0" smtClean="0"/>
+              <a:t>Example: Score vs RMSD across multiple targets</a:t>
+            </a:r>
+            <a:endParaRPr lang="en-US" dirty="0"/>
+          </a:p>
+        </p:txBody>
+      </p:sp>
+      <p:pic>
+        <p:nvPicPr>
+          <p:cNvPr id="7" name="Picture 6"/>
+          <p:cNvPicPr>
+            <a:picLocks noChangeAspect="1"/>
+          </p:cNvPicPr>
+          <p:nvPr/>
+        </p:nvPicPr>
+        <p:blipFill rotWithShape="1">
+          <a:blip r:embed="rId3"/>
+          <a:srcRect l="9561" r="19671" b="26249"/>
+          <a:stretch/>
+        </p:blipFill>
+        <p:spPr>
+          <a:xfrm>
+            <a:off x="6934200" y="2191599"/>
+            <a:ext cx="3733800" cy="3785867"/>
+          </a:xfrm>
+          <a:prstGeom prst="rect">
+            <a:avLst/>
+          </a:prstGeom>
+        </p:spPr>
+      </p:pic>
+    </p:spTree>
+    <p:extLst>
+      <p:ext uri="{BB962C8B-B14F-4D97-AF65-F5344CB8AC3E}">
+        <p14:creationId xmlns:p14="http://schemas.microsoft.com/office/powerpoint/2010/main" val="2484305846"/>
+      </p:ext>
+    </p:extLst>
+  </p:cSld>
+  <p:clrMapOvr>
+    <a:masterClrMapping/>
+  </p:clrMapOvr>
+  <p:timing>
+    <p:tnLst>
+      <p:par>
+        <p:cTn id="1" dur="indefinite" restart="never" nodeType="tmRoot"/>
+      </p:par>
+    </p:tnLst>
+  </p:timing>
+</p:sld>
+</file>
+
+<file path=ppt/slides/slide12.xml><?xml version="1.0" encoding="utf-8"?>
+<p:sld xmlns:a="http://schemas.openxmlformats.org/drawingml/2006/main" xmlns:r="http://schemas.openxmlformats.org/officeDocument/2006/relationships" xmlns:p="http://schemas.openxmlformats.org/presentationml/2006/main">
+  <p:cSld>
+    <p:spTree>
+      <p:nvGrpSpPr>
+        <p:cNvPr id="1" name=""/>
+        <p:cNvGrpSpPr/>
+        <p:nvPr/>
+      </p:nvGrpSpPr>
+      <p:grpSpPr>
+        <a:xfrm>
+          <a:off x="0" y="0"/>
+          <a:ext cx="0" cy="0"/>
+          <a:chOff x="0" y="0"/>
+          <a:chExt cx="0" cy="0"/>
+        </a:xfrm>
+      </p:grpSpPr>
+      <p:sp>
+        <p:nvSpPr>
+          <p:cNvPr id="2" name="Title 1"/>
+          <p:cNvSpPr>
+            <a:spLocks noGrp="1"/>
+          </p:cNvSpPr>
+          <p:nvPr>
+            <p:ph type="title"/>
+          </p:nvPr>
+        </p:nvSpPr>
+        <p:spPr/>
+        <p:txBody>
+          <a:bodyPr/>
+          <a:lstStyle/>
+          <a:p>
+            <a:r>
+              <a:rPr lang="en-US" dirty="0" smtClean="0"/>
               <a:t>Schedule and work distribution</a:t>
             </a:r>
             <a:endParaRPr lang="en-US" dirty="0"/>
@@ -3533,7 +3731,7 @@
 </p:sld>
 </file>
 
-<file path=ppt/slides/slide12.xml><?xml version="1.0" encoding="utf-8"?>
+<file path=ppt/slides/slide13.xml><?xml version="1.0" encoding="utf-8"?>
 <p:sld xmlns:a="http://schemas.openxmlformats.org/drawingml/2006/main" xmlns:r="http://schemas.openxmlformats.org/officeDocument/2006/relationships" xmlns:p="http://schemas.openxmlformats.org/presentationml/2006/main">
   <p:cSld>
     <p:spTree>
@@ -5014,22 +5212,50 @@
       </p:grpSpPr>
       <p:sp>
         <p:nvSpPr>
-          <p:cNvPr id="2" name="Title 1"/>
-          <p:cNvSpPr>
-            <a:spLocks noGrp="1"/>
-          </p:cNvSpPr>
-          <p:nvPr>
-            <p:ph type="title"/>
-          </p:nvPr>
-        </p:nvSpPr>
-        <p:spPr/>
+          <p:cNvPr id="2" name="Rectangle 1"/>
+          <p:cNvSpPr/>
+          <p:nvPr/>
+        </p:nvSpPr>
+        <p:spPr>
+          <a:xfrm>
+            <a:off x="3352800" y="304800"/>
+            <a:ext cx="1828800" cy="762000"/>
+          </a:xfrm>
+          <a:prstGeom prst="rect">
+            <a:avLst/>
+          </a:prstGeom>
+        </p:spPr>
+        <p:style>
+          <a:lnRef idx="2">
+            <a:schemeClr val="accent5">
+              <a:shade val="50000"/>
+            </a:schemeClr>
+          </a:lnRef>
+          <a:fillRef idx="1">
+            <a:schemeClr val="accent5"/>
+          </a:fillRef>
+          <a:effectRef idx="0">
+            <a:schemeClr val="accent5"/>
+          </a:effectRef>
+          <a:fontRef idx="minor">
+            <a:schemeClr val="lt1"/>
+          </a:fontRef>
+        </p:style>
         <p:txBody>
-          <a:bodyPr/>
+          <a:bodyPr rtlCol="0" anchor="ctr"/>
           <a:lstStyle/>
           <a:p>
-            <a:r>
-              <a:rPr lang="en-US" dirty="0" smtClean="0"/>
-              <a:t>Evaluation</a:t>
+            <a:pPr algn="ctr"/>
+            <a:r>
+              <a:rPr lang="en-US" dirty="0" smtClean="0"/>
+              <a:t>Server 1</a:t>
+            </a:r>
+          </a:p>
+          <a:p>
+            <a:pPr algn="ctr"/>
+            <a:r>
+              <a:rPr lang="en-US" dirty="0" smtClean="0"/>
+              <a:t>Hex</a:t>
             </a:r>
             <a:endParaRPr lang="en-US" dirty="0"/>
           </a:p>
@@ -5037,82 +5263,298 @@
       </p:sp>
       <p:sp>
         <p:nvSpPr>
-          <p:cNvPr id="3" name="Content Placeholder 2"/>
-          <p:cNvSpPr>
-            <a:spLocks noGrp="1"/>
-          </p:cNvSpPr>
-          <p:nvPr>
-            <p:ph idx="1"/>
-          </p:nvPr>
-        </p:nvSpPr>
-        <p:spPr/>
+          <p:cNvPr id="3" name="Rectangle 2"/>
+          <p:cNvSpPr/>
+          <p:nvPr/>
+        </p:nvSpPr>
+        <p:spPr>
+          <a:xfrm>
+            <a:off x="3352800" y="1219200"/>
+            <a:ext cx="1828800" cy="762000"/>
+          </a:xfrm>
+          <a:prstGeom prst="rect">
+            <a:avLst/>
+          </a:prstGeom>
+        </p:spPr>
+        <p:style>
+          <a:lnRef idx="2">
+            <a:schemeClr val="accent5">
+              <a:shade val="50000"/>
+            </a:schemeClr>
+          </a:lnRef>
+          <a:fillRef idx="1">
+            <a:schemeClr val="accent5"/>
+          </a:fillRef>
+          <a:effectRef idx="0">
+            <a:schemeClr val="accent5"/>
+          </a:effectRef>
+          <a:fontRef idx="minor">
+            <a:schemeClr val="lt1"/>
+          </a:fontRef>
+        </p:style>
         <p:txBody>
-          <a:bodyPr/>
+          <a:bodyPr rtlCol="0" anchor="ctr"/>
           <a:lstStyle/>
           <a:p>
+            <a:pPr algn="ctr"/>
+            <a:r>
+              <a:rPr lang="en-US" dirty="0" smtClean="0"/>
+              <a:t>Server 2</a:t>
+            </a:r>
+          </a:p>
+          <a:p>
+            <a:pPr algn="ctr"/>
             <a:r>
               <a:rPr lang="en-US" dirty="0" err="1" smtClean="0"/>
-              <a:t>Rmsd</a:t>
-            </a:r>
-            <a:r>
-              <a:rPr lang="en-US" dirty="0" smtClean="0"/>
-              <a:t> of interfaces</a:t>
-            </a:r>
-          </a:p>
-          <a:p>
-            <a:r>
-              <a:rPr lang="en-US" dirty="0" smtClean="0"/>
-              <a:t>% similarity between predicted residue-residue interface sequence and native interface</a:t>
-            </a:r>
-          </a:p>
-          <a:p>
-            <a:r>
-              <a:rPr lang="en-US" dirty="0" smtClean="0"/>
-              <a:t>Un-optimized vs Optimized predictions</a:t>
-            </a:r>
-          </a:p>
-          <a:p>
-            <a:r>
-              <a:rPr lang="en-US" dirty="0" smtClean="0"/>
-              <a:t>Score (</a:t>
-            </a:r>
-            <a:r>
-              <a:rPr lang="en-US" dirty="0" err="1" smtClean="0"/>
-              <a:t>Zdock</a:t>
-            </a:r>
-            <a:r>
-              <a:rPr lang="en-US" dirty="0" smtClean="0"/>
-              <a:t>, </a:t>
-            </a:r>
-            <a:r>
-              <a:rPr lang="en-US" dirty="0" err="1" smtClean="0"/>
-              <a:t>RosettaDock</a:t>
-            </a:r>
-            <a:r>
-              <a:rPr lang="en-US" dirty="0" smtClean="0"/>
-              <a:t>, etc.) vs </a:t>
-            </a:r>
-            <a:r>
-              <a:rPr lang="en-US" dirty="0" err="1" smtClean="0"/>
-              <a:t>rmsd</a:t>
-            </a:r>
-            <a:r>
-              <a:rPr lang="en-US" dirty="0" smtClean="0"/>
-              <a:t> and</a:t>
-            </a:r>
-            <a:br>
-              <a:rPr lang="en-US" dirty="0" smtClean="0"/>
-            </a:br>
-            <a:r>
-              <a:rPr lang="en-US" dirty="0" smtClean="0"/>
-              <a:t>similarity will be used for both optimized</a:t>
-            </a:r>
-            <a:br>
-              <a:rPr lang="en-US" dirty="0" smtClean="0"/>
-            </a:br>
-            <a:r>
-              <a:rPr lang="en-US" dirty="0" smtClean="0"/>
-              <a:t>and un-optimized predictions for comparison</a:t>
+              <a:t>ClusPro</a:t>
+            </a:r>
+            <a:endParaRPr lang="en-US" dirty="0"/>
+          </a:p>
+        </p:txBody>
+      </p:sp>
+      <p:sp>
+        <p:nvSpPr>
+          <p:cNvPr id="4" name="Rectangle 3"/>
+          <p:cNvSpPr/>
+          <p:nvPr/>
+        </p:nvSpPr>
+        <p:spPr>
+          <a:xfrm>
+            <a:off x="3352800" y="2133600"/>
+            <a:ext cx="1828800" cy="762000"/>
+          </a:xfrm>
+          <a:prstGeom prst="rect">
+            <a:avLst/>
+          </a:prstGeom>
+        </p:spPr>
+        <p:style>
+          <a:lnRef idx="2">
+            <a:schemeClr val="accent5">
+              <a:shade val="50000"/>
+            </a:schemeClr>
+          </a:lnRef>
+          <a:fillRef idx="1">
+            <a:schemeClr val="accent5"/>
+          </a:fillRef>
+          <a:effectRef idx="0">
+            <a:schemeClr val="accent5"/>
+          </a:effectRef>
+          <a:fontRef idx="minor">
+            <a:schemeClr val="lt1"/>
+          </a:fontRef>
+        </p:style>
+        <p:txBody>
+          <a:bodyPr rtlCol="0" anchor="ctr"/>
+          <a:lstStyle/>
+          <a:p>
+            <a:pPr algn="ctr"/>
+            <a:r>
+              <a:rPr lang="en-US" dirty="0" smtClean="0"/>
+              <a:t>Server 3</a:t>
+            </a:r>
+          </a:p>
+          <a:p>
+            <a:pPr algn="ctr"/>
+            <a:r>
+              <a:rPr lang="en-US" dirty="0" smtClean="0"/>
+              <a:t>ZDOCK</a:t>
+            </a:r>
+            <a:endParaRPr lang="en-US" dirty="0"/>
+          </a:p>
+        </p:txBody>
+      </p:sp>
+      <p:sp>
+        <p:nvSpPr>
+          <p:cNvPr id="5" name="Rounded Rectangle 4"/>
+          <p:cNvSpPr/>
+          <p:nvPr/>
+        </p:nvSpPr>
+        <p:spPr>
+          <a:xfrm>
+            <a:off x="6096000" y="685800"/>
+            <a:ext cx="914400" cy="1828800"/>
+          </a:xfrm>
+          <a:prstGeom prst="roundRect">
+            <a:avLst/>
+          </a:prstGeom>
+        </p:spPr>
+        <p:style>
+          <a:lnRef idx="1">
+            <a:schemeClr val="accent1"/>
+          </a:lnRef>
+          <a:fillRef idx="2">
+            <a:schemeClr val="accent1"/>
+          </a:fillRef>
+          <a:effectRef idx="1">
+            <a:schemeClr val="accent1"/>
+          </a:effectRef>
+          <a:fontRef idx="minor">
+            <a:schemeClr val="dk1"/>
+          </a:fontRef>
+        </p:style>
+        <p:txBody>
+          <a:bodyPr vert="vert270" rtlCol="0" anchor="ctr"/>
+          <a:lstStyle/>
+          <a:p>
+            <a:pPr algn="ctr"/>
+            <a:r>
+              <a:rPr lang="en-US" dirty="0"/>
+              <a:t>Ranking</a:t>
+            </a:r>
+          </a:p>
+          <a:p>
+            <a:pPr algn="ctr"/>
+            <a:r>
+              <a:rPr lang="en-US" dirty="0"/>
+              <a:t>Rosetta</a:t>
+            </a:r>
+            <a:endParaRPr lang="en-US" dirty="0"/>
+          </a:p>
+        </p:txBody>
+      </p:sp>
+      <p:sp>
+        <p:nvSpPr>
+          <p:cNvPr id="6" name="Rectangle 5"/>
+          <p:cNvSpPr/>
+          <p:nvPr/>
+        </p:nvSpPr>
+        <p:spPr>
+          <a:xfrm>
+            <a:off x="7924800" y="1219200"/>
+            <a:ext cx="1828800" cy="762000"/>
+          </a:xfrm>
+          <a:prstGeom prst="rect">
+            <a:avLst/>
+          </a:prstGeom>
+        </p:spPr>
+        <p:style>
+          <a:lnRef idx="1">
+            <a:schemeClr val="accent6"/>
+          </a:lnRef>
+          <a:fillRef idx="2">
+            <a:schemeClr val="accent6"/>
+          </a:fillRef>
+          <a:effectRef idx="1">
+            <a:schemeClr val="accent6"/>
+          </a:effectRef>
+          <a:fontRef idx="minor">
+            <a:schemeClr val="dk1"/>
+          </a:fontRef>
+        </p:style>
+        <p:txBody>
+          <a:bodyPr rtlCol="0" anchor="ctr"/>
+          <a:lstStyle/>
+          <a:p>
+            <a:pPr algn="ctr"/>
+            <a:r>
+              <a:rPr lang="en-US" dirty="0" smtClean="0"/>
+              <a:t>Optimization</a:t>
+            </a:r>
+          </a:p>
+          <a:p>
+            <a:pPr algn="ctr"/>
+            <a:r>
+              <a:rPr lang="en-US" dirty="0" smtClean="0"/>
+              <a:t>Rosetta</a:t>
+            </a:r>
+            <a:endParaRPr lang="en-US" dirty="0"/>
+          </a:p>
+        </p:txBody>
+      </p:sp>
+      <p:sp>
+        <p:nvSpPr>
+          <p:cNvPr id="7" name="Rounded Rectangle 6"/>
+          <p:cNvSpPr/>
+          <p:nvPr/>
+        </p:nvSpPr>
+        <p:spPr>
+          <a:xfrm rot="5400000">
+            <a:off x="8382000" y="2057400"/>
+            <a:ext cx="914400" cy="1828800"/>
+          </a:xfrm>
+          <a:prstGeom prst="roundRect">
+            <a:avLst/>
+          </a:prstGeom>
+        </p:spPr>
+        <p:style>
+          <a:lnRef idx="1">
+            <a:schemeClr val="accent1"/>
+          </a:lnRef>
+          <a:fillRef idx="2">
+            <a:schemeClr val="accent1"/>
+          </a:fillRef>
+          <a:effectRef idx="1">
+            <a:schemeClr val="accent1"/>
+          </a:effectRef>
+          <a:fontRef idx="minor">
+            <a:schemeClr val="dk1"/>
+          </a:fontRef>
+        </p:style>
+        <p:txBody>
+          <a:bodyPr vert="vert270" rtlCol="0" anchor="ctr"/>
+          <a:lstStyle/>
+          <a:p>
+            <a:pPr algn="ctr"/>
+            <a:r>
+              <a:rPr lang="en-US" dirty="0" smtClean="0"/>
+              <a:t>Ranking</a:t>
+            </a:r>
+          </a:p>
+          <a:p>
+            <a:pPr algn="ctr"/>
+            <a:r>
+              <a:rPr lang="en-US" dirty="0"/>
+              <a:t>Rosetta</a:t>
+            </a:r>
+          </a:p>
+        </p:txBody>
+      </p:sp>
+      <p:sp>
+        <p:nvSpPr>
+          <p:cNvPr id="8" name="Rectangle 7"/>
+          <p:cNvSpPr/>
+          <p:nvPr/>
+        </p:nvSpPr>
+        <p:spPr>
+          <a:xfrm>
+            <a:off x="7924800" y="3951514"/>
+            <a:ext cx="1828800" cy="762000"/>
+          </a:xfrm>
+          <a:prstGeom prst="rect">
+            <a:avLst/>
+          </a:prstGeom>
+        </p:spPr>
+        <p:style>
+          <a:lnRef idx="2">
+            <a:schemeClr val="accent2">
+              <a:shade val="50000"/>
+            </a:schemeClr>
+          </a:lnRef>
+          <a:fillRef idx="1">
+            <a:schemeClr val="accent2"/>
+          </a:fillRef>
+          <a:effectRef idx="0">
+            <a:schemeClr val="accent2"/>
+          </a:effectRef>
+          <a:fontRef idx="minor">
+            <a:schemeClr val="lt1"/>
+          </a:fontRef>
+        </p:style>
+        <p:txBody>
+          <a:bodyPr rtlCol="0" anchor="ctr"/>
+          <a:lstStyle/>
+          <a:p>
+            <a:pPr algn="ctr"/>
+            <a:r>
+              <a:rPr lang="en-US" dirty="0" smtClean="0"/>
+              <a:t>Visualization</a:t>
+            </a:r>
+          </a:p>
+          <a:p>
+            <a:pPr algn="ctr"/>
+            <a:r>
+              <a:rPr lang="en-US" dirty="0" smtClean="0"/>
+              <a:t>Chimera</a:t>
             </a:r>
             <a:endParaRPr lang="en-US" dirty="0"/>
           </a:p>
@@ -5120,62 +5562,446 @@
       </p:sp>
       <p:pic>
         <p:nvPicPr>
-          <p:cNvPr id="4" name="Picture 3"/>
+          <p:cNvPr id="9" name="Picture 2" descr="http://vred.bioinf.uni-sb.de/DFG-protein-protein-docking/DATA/dockingbeispiel.jpg"/>
           <p:cNvPicPr>
-            <a:picLocks noChangeAspect="1"/>
+            <a:picLocks noChangeAspect="1" noChangeArrowheads="1"/>
           </p:cNvPicPr>
           <p:nvPr/>
         </p:nvPicPr>
-        <p:blipFill>
-          <a:blip r:embed="rId2"/>
-          <a:stretch>
-            <a:fillRect/>
-          </a:stretch>
+        <p:blipFill rotWithShape="1">
+          <a:blip r:embed="rId2">
+            <a:extLst>
+              <a:ext uri="{28A0092B-C50C-407E-A947-70E740481C1C}">
+                <a14:useLocalDpi xmlns:a14="http://schemas.microsoft.com/office/drawing/2010/main" val="0"/>
+              </a:ext>
+            </a:extLst>
+          </a:blip>
+          <a:srcRect l="5565" r="61565"/>
+          <a:stretch/>
         </p:blipFill>
-        <p:spPr>
-          <a:xfrm>
-            <a:off x="7086600" y="3581400"/>
-            <a:ext cx="3879533" cy="2477550"/>
+        <p:spPr bwMode="auto">
+          <a:xfrm>
+            <a:off x="1143000" y="304800"/>
+            <a:ext cx="1280578" cy="2590800"/>
           </a:xfrm>
           <a:prstGeom prst="rect">
             <a:avLst/>
           </a:prstGeom>
+          <a:noFill/>
+          <a:extLst>
+            <a:ext uri="{909E8E84-426E-40DD-AFC4-6F175D3DCCD1}">
+              <a14:hiddenFill xmlns:a14="http://schemas.microsoft.com/office/drawing/2010/main">
+                <a:solidFill>
+                  <a:srgbClr val="FFFFFF"/>
+                </a:solidFill>
+              </a14:hiddenFill>
+            </a:ext>
+          </a:extLst>
         </p:spPr>
       </p:pic>
-      <p:sp>
-        <p:nvSpPr>
-          <p:cNvPr id="5" name="TextBox 4"/>
-          <p:cNvSpPr txBox="1"/>
-          <p:nvPr/>
-        </p:nvSpPr>
-        <p:spPr>
-          <a:xfrm>
-            <a:off x="6700504" y="3212068"/>
-            <a:ext cx="4651723" cy="369332"/>
+      <p:pic>
+        <p:nvPicPr>
+          <p:cNvPr id="10" name="Picture 2" descr="http://vred.bioinf.uni-sb.de/DFG-protein-protein-docking/DATA/dockingbeispiel.jpg"/>
+          <p:cNvPicPr>
+            <a:picLocks noChangeAspect="1" noChangeArrowheads="1"/>
+          </p:cNvPicPr>
+          <p:nvPr/>
+        </p:nvPicPr>
+        <p:blipFill rotWithShape="1">
+          <a:blip r:embed="rId2">
+            <a:extLst>
+              <a:ext uri="{28A0092B-C50C-407E-A947-70E740481C1C}">
+                <a14:useLocalDpi xmlns:a14="http://schemas.microsoft.com/office/drawing/2010/main" val="0"/>
+              </a:ext>
+            </a:extLst>
+          </a:blip>
+          <a:srcRect l="57423" t="12716" r="5557" b="15105"/>
+          <a:stretch/>
+        </p:blipFill>
+        <p:spPr bwMode="auto">
+          <a:xfrm>
+            <a:off x="4648200" y="3124200"/>
+            <a:ext cx="1905000" cy="2396613"/>
           </a:xfrm>
           <a:prstGeom prst="rect">
             <a:avLst/>
           </a:prstGeom>
           <a:noFill/>
-        </p:spPr>
-        <p:txBody>
-          <a:bodyPr wrap="none" rtlCol="0">
-            <a:spAutoFit/>
-          </a:bodyPr>
-          <a:lstStyle/>
-          <a:p>
-            <a:r>
-              <a:rPr lang="en-US" dirty="0" smtClean="0"/>
-              <a:t>Example: Score vs RMSD across multiple targets</a:t>
-            </a:r>
-            <a:endParaRPr lang="en-US" dirty="0"/>
-          </a:p>
-        </p:txBody>
-      </p:sp>
+          <a:extLst>
+            <a:ext uri="{909E8E84-426E-40DD-AFC4-6F175D3DCCD1}">
+              <a14:hiddenFill xmlns:a14="http://schemas.microsoft.com/office/drawing/2010/main">
+                <a:solidFill>
+                  <a:srgbClr val="FFFFFF"/>
+                </a:solidFill>
+              </a14:hiddenFill>
+            </a:ext>
+          </a:extLst>
+        </p:spPr>
+      </p:pic>
+      <p:cxnSp>
+        <p:nvCxnSpPr>
+          <p:cNvPr id="12" name="Straight Arrow Connector 11"/>
+          <p:cNvCxnSpPr>
+            <a:stCxn id="9" idx="3"/>
+            <a:endCxn id="2" idx="1"/>
+          </p:cNvCxnSpPr>
+          <p:nvPr/>
+        </p:nvCxnSpPr>
+        <p:spPr>
+          <a:xfrm flipV="1">
+            <a:off x="2423578" y="685800"/>
+            <a:ext cx="929222" cy="914400"/>
+          </a:xfrm>
+          <a:prstGeom prst="straightConnector1">
+            <a:avLst/>
+          </a:prstGeom>
+          <a:ln w="19050">
+            <a:tailEnd type="triangle"/>
+          </a:ln>
+        </p:spPr>
+        <p:style>
+          <a:lnRef idx="1">
+            <a:schemeClr val="dk1"/>
+          </a:lnRef>
+          <a:fillRef idx="0">
+            <a:schemeClr val="dk1"/>
+          </a:fillRef>
+          <a:effectRef idx="0">
+            <a:schemeClr val="dk1"/>
+          </a:effectRef>
+          <a:fontRef idx="minor">
+            <a:schemeClr val="tx1"/>
+          </a:fontRef>
+        </p:style>
+      </p:cxnSp>
+      <p:cxnSp>
+        <p:nvCxnSpPr>
+          <p:cNvPr id="14" name="Straight Arrow Connector 13"/>
+          <p:cNvCxnSpPr>
+            <a:stCxn id="9" idx="3"/>
+            <a:endCxn id="3" idx="1"/>
+          </p:cNvCxnSpPr>
+          <p:nvPr/>
+        </p:nvCxnSpPr>
+        <p:spPr>
+          <a:xfrm>
+            <a:off x="2423578" y="1600200"/>
+            <a:ext cx="929222" cy="0"/>
+          </a:xfrm>
+          <a:prstGeom prst="straightConnector1">
+            <a:avLst/>
+          </a:prstGeom>
+          <a:ln w="19050">
+            <a:tailEnd type="triangle"/>
+          </a:ln>
+        </p:spPr>
+        <p:style>
+          <a:lnRef idx="1">
+            <a:schemeClr val="dk1"/>
+          </a:lnRef>
+          <a:fillRef idx="0">
+            <a:schemeClr val="dk1"/>
+          </a:fillRef>
+          <a:effectRef idx="0">
+            <a:schemeClr val="dk1"/>
+          </a:effectRef>
+          <a:fontRef idx="minor">
+            <a:schemeClr val="tx1"/>
+          </a:fontRef>
+        </p:style>
+      </p:cxnSp>
+      <p:cxnSp>
+        <p:nvCxnSpPr>
+          <p:cNvPr id="16" name="Straight Arrow Connector 15"/>
+          <p:cNvCxnSpPr>
+            <a:stCxn id="9" idx="3"/>
+            <a:endCxn id="4" idx="1"/>
+          </p:cNvCxnSpPr>
+          <p:nvPr/>
+        </p:nvCxnSpPr>
+        <p:spPr>
+          <a:xfrm>
+            <a:off x="2423578" y="1600200"/>
+            <a:ext cx="929222" cy="914400"/>
+          </a:xfrm>
+          <a:prstGeom prst="straightConnector1">
+            <a:avLst/>
+          </a:prstGeom>
+          <a:ln w="19050">
+            <a:tailEnd type="triangle"/>
+          </a:ln>
+        </p:spPr>
+        <p:style>
+          <a:lnRef idx="1">
+            <a:schemeClr val="dk1"/>
+          </a:lnRef>
+          <a:fillRef idx="0">
+            <a:schemeClr val="dk1"/>
+          </a:fillRef>
+          <a:effectRef idx="0">
+            <a:schemeClr val="dk1"/>
+          </a:effectRef>
+          <a:fontRef idx="minor">
+            <a:schemeClr val="tx1"/>
+          </a:fontRef>
+        </p:style>
+      </p:cxnSp>
+      <p:cxnSp>
+        <p:nvCxnSpPr>
+          <p:cNvPr id="18" name="Straight Arrow Connector 17"/>
+          <p:cNvCxnSpPr>
+            <a:stCxn id="2" idx="3"/>
+            <a:endCxn id="5" idx="1"/>
+          </p:cNvCxnSpPr>
+          <p:nvPr/>
+        </p:nvCxnSpPr>
+        <p:spPr>
+          <a:xfrm>
+            <a:off x="5181600" y="685800"/>
+            <a:ext cx="914400" cy="914400"/>
+          </a:xfrm>
+          <a:prstGeom prst="straightConnector1">
+            <a:avLst/>
+          </a:prstGeom>
+          <a:ln w="19050">
+            <a:tailEnd type="triangle"/>
+          </a:ln>
+        </p:spPr>
+        <p:style>
+          <a:lnRef idx="1">
+            <a:schemeClr val="dk1"/>
+          </a:lnRef>
+          <a:fillRef idx="0">
+            <a:schemeClr val="dk1"/>
+          </a:fillRef>
+          <a:effectRef idx="0">
+            <a:schemeClr val="dk1"/>
+          </a:effectRef>
+          <a:fontRef idx="minor">
+            <a:schemeClr val="tx1"/>
+          </a:fontRef>
+        </p:style>
+      </p:cxnSp>
+      <p:cxnSp>
+        <p:nvCxnSpPr>
+          <p:cNvPr id="20" name="Straight Arrow Connector 19"/>
+          <p:cNvCxnSpPr>
+            <a:stCxn id="3" idx="3"/>
+            <a:endCxn id="5" idx="1"/>
+          </p:cNvCxnSpPr>
+          <p:nvPr/>
+        </p:nvCxnSpPr>
+        <p:spPr>
+          <a:xfrm>
+            <a:off x="5181600" y="1600200"/>
+            <a:ext cx="914400" cy="0"/>
+          </a:xfrm>
+          <a:prstGeom prst="straightConnector1">
+            <a:avLst/>
+          </a:prstGeom>
+          <a:ln w="19050">
+            <a:tailEnd type="triangle"/>
+          </a:ln>
+        </p:spPr>
+        <p:style>
+          <a:lnRef idx="1">
+            <a:schemeClr val="dk1"/>
+          </a:lnRef>
+          <a:fillRef idx="0">
+            <a:schemeClr val="dk1"/>
+          </a:fillRef>
+          <a:effectRef idx="0">
+            <a:schemeClr val="dk1"/>
+          </a:effectRef>
+          <a:fontRef idx="minor">
+            <a:schemeClr val="tx1"/>
+          </a:fontRef>
+        </p:style>
+      </p:cxnSp>
+      <p:cxnSp>
+        <p:nvCxnSpPr>
+          <p:cNvPr id="22" name="Straight Arrow Connector 21"/>
+          <p:cNvCxnSpPr>
+            <a:stCxn id="4" idx="3"/>
+            <a:endCxn id="5" idx="1"/>
+          </p:cNvCxnSpPr>
+          <p:nvPr/>
+        </p:nvCxnSpPr>
+        <p:spPr>
+          <a:xfrm flipV="1">
+            <a:off x="5181600" y="1600200"/>
+            <a:ext cx="914400" cy="914400"/>
+          </a:xfrm>
+          <a:prstGeom prst="straightConnector1">
+            <a:avLst/>
+          </a:prstGeom>
+          <a:ln w="19050">
+            <a:tailEnd type="triangle"/>
+          </a:ln>
+        </p:spPr>
+        <p:style>
+          <a:lnRef idx="1">
+            <a:schemeClr val="dk1"/>
+          </a:lnRef>
+          <a:fillRef idx="0">
+            <a:schemeClr val="dk1"/>
+          </a:fillRef>
+          <a:effectRef idx="0">
+            <a:schemeClr val="dk1"/>
+          </a:effectRef>
+          <a:fontRef idx="minor">
+            <a:schemeClr val="tx1"/>
+          </a:fontRef>
+        </p:style>
+      </p:cxnSp>
+      <p:cxnSp>
+        <p:nvCxnSpPr>
+          <p:cNvPr id="24" name="Straight Arrow Connector 23"/>
+          <p:cNvCxnSpPr>
+            <a:stCxn id="5" idx="3"/>
+            <a:endCxn id="6" idx="1"/>
+          </p:cNvCxnSpPr>
+          <p:nvPr/>
+        </p:nvCxnSpPr>
+        <p:spPr>
+          <a:xfrm>
+            <a:off x="7010400" y="1600200"/>
+            <a:ext cx="914400" cy="0"/>
+          </a:xfrm>
+          <a:prstGeom prst="straightConnector1">
+            <a:avLst/>
+          </a:prstGeom>
+          <a:ln w="19050">
+            <a:tailEnd type="triangle"/>
+          </a:ln>
+        </p:spPr>
+        <p:style>
+          <a:lnRef idx="1">
+            <a:schemeClr val="dk1"/>
+          </a:lnRef>
+          <a:fillRef idx="0">
+            <a:schemeClr val="dk1"/>
+          </a:fillRef>
+          <a:effectRef idx="0">
+            <a:schemeClr val="dk1"/>
+          </a:effectRef>
+          <a:fontRef idx="minor">
+            <a:schemeClr val="tx1"/>
+          </a:fontRef>
+        </p:style>
+      </p:cxnSp>
+      <p:cxnSp>
+        <p:nvCxnSpPr>
+          <p:cNvPr id="26" name="Straight Arrow Connector 25"/>
+          <p:cNvCxnSpPr>
+            <a:stCxn id="6" idx="2"/>
+            <a:endCxn id="7" idx="1"/>
+          </p:cNvCxnSpPr>
+          <p:nvPr/>
+        </p:nvCxnSpPr>
+        <p:spPr>
+          <a:xfrm>
+            <a:off x="8839200" y="1981200"/>
+            <a:ext cx="0" cy="533400"/>
+          </a:xfrm>
+          <a:prstGeom prst="straightConnector1">
+            <a:avLst/>
+          </a:prstGeom>
+          <a:ln w="19050">
+            <a:tailEnd type="triangle"/>
+          </a:ln>
+        </p:spPr>
+        <p:style>
+          <a:lnRef idx="1">
+            <a:schemeClr val="dk1"/>
+          </a:lnRef>
+          <a:fillRef idx="0">
+            <a:schemeClr val="dk1"/>
+          </a:fillRef>
+          <a:effectRef idx="0">
+            <a:schemeClr val="dk1"/>
+          </a:effectRef>
+          <a:fontRef idx="minor">
+            <a:schemeClr val="tx1"/>
+          </a:fontRef>
+        </p:style>
+      </p:cxnSp>
+      <p:cxnSp>
+        <p:nvCxnSpPr>
+          <p:cNvPr id="28" name="Straight Arrow Connector 27"/>
+          <p:cNvCxnSpPr>
+            <a:stCxn id="7" idx="3"/>
+            <a:endCxn id="8" idx="0"/>
+          </p:cNvCxnSpPr>
+          <p:nvPr/>
+        </p:nvCxnSpPr>
+        <p:spPr>
+          <a:xfrm>
+            <a:off x="8839200" y="3429000"/>
+            <a:ext cx="0" cy="522514"/>
+          </a:xfrm>
+          <a:prstGeom prst="straightConnector1">
+            <a:avLst/>
+          </a:prstGeom>
+          <a:ln w="19050">
+            <a:tailEnd type="triangle"/>
+          </a:ln>
+        </p:spPr>
+        <p:style>
+          <a:lnRef idx="1">
+            <a:schemeClr val="dk1"/>
+          </a:lnRef>
+          <a:fillRef idx="0">
+            <a:schemeClr val="dk1"/>
+          </a:fillRef>
+          <a:effectRef idx="0">
+            <a:schemeClr val="dk1"/>
+          </a:effectRef>
+          <a:fontRef idx="minor">
+            <a:schemeClr val="tx1"/>
+          </a:fontRef>
+        </p:style>
+      </p:cxnSp>
+      <p:cxnSp>
+        <p:nvCxnSpPr>
+          <p:cNvPr id="32" name="Straight Arrow Connector 31"/>
+          <p:cNvCxnSpPr>
+            <a:stCxn id="8" idx="1"/>
+            <a:endCxn id="10" idx="3"/>
+          </p:cNvCxnSpPr>
+          <p:nvPr/>
+        </p:nvCxnSpPr>
+        <p:spPr>
+          <a:xfrm flipH="1" flipV="1">
+            <a:off x="6553200" y="4322507"/>
+            <a:ext cx="1371600" cy="10007"/>
+          </a:xfrm>
+          <a:prstGeom prst="straightConnector1">
+            <a:avLst/>
+          </a:prstGeom>
+          <a:ln w="19050">
+            <a:tailEnd type="triangle"/>
+          </a:ln>
+        </p:spPr>
+        <p:style>
+          <a:lnRef idx="1">
+            <a:schemeClr val="dk1"/>
+          </a:lnRef>
+          <a:fillRef idx="0">
+            <a:schemeClr val="dk1"/>
+          </a:fillRef>
+          <a:effectRef idx="0">
+            <a:schemeClr val="dk1"/>
+          </a:effectRef>
+          <a:fontRef idx="minor">
+            <a:schemeClr val="tx1"/>
+          </a:fontRef>
+        </p:style>
+      </p:cxnSp>
     </p:spTree>
     <p:extLst>
       <p:ext uri="{BB962C8B-B14F-4D97-AF65-F5344CB8AC3E}">
-        <p14:creationId xmlns:p14="http://schemas.microsoft.com/office/powerpoint/2010/main" val="487030976"/>
+        <p14:creationId xmlns:p14="http://schemas.microsoft.com/office/powerpoint/2010/main" val="2380757942"/>
       </p:ext>
     </p:extLst>
   </p:cSld>

</xml_diff>